<commit_message>
Commented Proposal from supervisor
@jithinvarghese
</commit_message>
<xml_diff>
--- a/Proposel/ProposelPresentation.pptx
+++ b/Proposel/ProposelPresentation.pptx
@@ -10,9 +10,9 @@
     <p:sldId id="259" r:id="rId4"/>
     <p:sldId id="260" r:id="rId5"/>
     <p:sldId id="261" r:id="rId6"/>
-    <p:sldId id="279" r:id="rId7"/>
-    <p:sldId id="272" r:id="rId8"/>
-    <p:sldId id="278" r:id="rId9"/>
+    <p:sldId id="278" r:id="rId7"/>
+    <p:sldId id="279" r:id="rId8"/>
+    <p:sldId id="272" r:id="rId9"/>
     <p:sldId id="277" r:id="rId10"/>
     <p:sldId id="262" r:id="rId11"/>
     <p:sldId id="265" r:id="rId12"/>
@@ -350,7 +350,7 @@
           <a:p>
             <a:fld id="{3A204C59-DFA0-104C-896B-59F4AEBE75FA}" type="datetimeFigureOut">
               <a:rPr lang="en-US" smtClean="0"/>
-              <a:t>10/30/18</a:t>
+              <a:t>2018-10-30</a:t>
             </a:fld>
             <a:endParaRPr lang="en-US"/>
           </a:p>
@@ -520,7 +520,7 @@
           <a:p>
             <a:fld id="{3A204C59-DFA0-104C-896B-59F4AEBE75FA}" type="datetimeFigureOut">
               <a:rPr lang="en-US" smtClean="0"/>
-              <a:t>10/30/18</a:t>
+              <a:t>2018-10-30</a:t>
             </a:fld>
             <a:endParaRPr lang="en-US"/>
           </a:p>
@@ -700,7 +700,7 @@
           <a:p>
             <a:fld id="{3A204C59-DFA0-104C-896B-59F4AEBE75FA}" type="datetimeFigureOut">
               <a:rPr lang="en-US" smtClean="0"/>
-              <a:t>10/30/18</a:t>
+              <a:t>2018-10-30</a:t>
             </a:fld>
             <a:endParaRPr lang="en-US"/>
           </a:p>
@@ -870,7 +870,7 @@
           <a:p>
             <a:fld id="{3A204C59-DFA0-104C-896B-59F4AEBE75FA}" type="datetimeFigureOut">
               <a:rPr lang="en-US" smtClean="0"/>
-              <a:t>10/30/18</a:t>
+              <a:t>2018-10-30</a:t>
             </a:fld>
             <a:endParaRPr lang="en-US"/>
           </a:p>
@@ -1128,7 +1128,7 @@
           <a:p>
             <a:fld id="{3A204C59-DFA0-104C-896B-59F4AEBE75FA}" type="datetimeFigureOut">
               <a:rPr lang="en-US" smtClean="0"/>
-              <a:t>10/30/18</a:t>
+              <a:t>2018-10-30</a:t>
             </a:fld>
             <a:endParaRPr lang="en-US"/>
           </a:p>
@@ -1416,7 +1416,7 @@
           <a:p>
             <a:fld id="{3A204C59-DFA0-104C-896B-59F4AEBE75FA}" type="datetimeFigureOut">
               <a:rPr lang="en-US" smtClean="0"/>
-              <a:t>10/30/18</a:t>
+              <a:t>2018-10-30</a:t>
             </a:fld>
             <a:endParaRPr lang="en-US"/>
           </a:p>
@@ -1858,7 +1858,7 @@
           <a:p>
             <a:fld id="{3A204C59-DFA0-104C-896B-59F4AEBE75FA}" type="datetimeFigureOut">
               <a:rPr lang="en-US" smtClean="0"/>
-              <a:t>10/30/18</a:t>
+              <a:t>2018-10-30</a:t>
             </a:fld>
             <a:endParaRPr lang="en-US"/>
           </a:p>
@@ -1976,7 +1976,7 @@
           <a:p>
             <a:fld id="{3A204C59-DFA0-104C-896B-59F4AEBE75FA}" type="datetimeFigureOut">
               <a:rPr lang="en-US" smtClean="0"/>
-              <a:t>10/30/18</a:t>
+              <a:t>2018-10-30</a:t>
             </a:fld>
             <a:endParaRPr lang="en-US"/>
           </a:p>
@@ -2071,7 +2071,7 @@
           <a:p>
             <a:fld id="{3A204C59-DFA0-104C-896B-59F4AEBE75FA}" type="datetimeFigureOut">
               <a:rPr lang="en-US" smtClean="0"/>
-              <a:t>10/30/18</a:t>
+              <a:t>2018-10-30</a:t>
             </a:fld>
             <a:endParaRPr lang="en-US"/>
           </a:p>
@@ -2359,7 +2359,7 @@
           <a:p>
             <a:fld id="{3A204C59-DFA0-104C-896B-59F4AEBE75FA}" type="datetimeFigureOut">
               <a:rPr lang="en-US" smtClean="0"/>
-              <a:t>10/30/18</a:t>
+              <a:t>2018-10-30</a:t>
             </a:fld>
             <a:endParaRPr lang="en-US"/>
           </a:p>
@@ -2632,7 +2632,7 @@
           <a:p>
             <a:fld id="{3A204C59-DFA0-104C-896B-59F4AEBE75FA}" type="datetimeFigureOut">
               <a:rPr lang="en-US" smtClean="0"/>
-              <a:t>10/30/18</a:t>
+              <a:t>2018-10-30</a:t>
             </a:fld>
             <a:endParaRPr lang="en-US"/>
           </a:p>
@@ -2929,7 +2929,7 @@
           <a:p>
             <a:fld id="{3A204C59-DFA0-104C-896B-59F4AEBE75FA}" type="datetimeFigureOut">
               <a:rPr lang="en-US" smtClean="0"/>
-              <a:t>10/30/18</a:t>
+              <a:t>2018-10-30</a:t>
             </a:fld>
             <a:endParaRPr lang="en-US"/>
           </a:p>
@@ -5004,7 +5004,7 @@
           <p:cNvPr id="2" name="Title 1">
             <a:extLst>
               <a:ext uri="{FF2B5EF4-FFF2-40B4-BE49-F238E27FC236}">
-                <a16:creationId xmlns:a16="http://schemas.microsoft.com/office/drawing/2014/main" id="{3B208F93-8020-AE42-B24A-2C10BC5666FC}"/>
+                <a16:creationId xmlns:a16="http://schemas.microsoft.com/office/drawing/2014/main" id="{380E3E29-98C8-004F-93A3-3EA2286853FB}"/>
               </a:ext>
             </a:extLst>
           </p:cNvPr>
@@ -5021,10 +5021,9 @@
           <a:lstStyle/>
           <a:p>
             <a:r>
-              <a:rPr lang="en-NZ" b="1" dirty="0"/>
-              <a:t>Existing Applications</a:t>
-            </a:r>
-            <a:endParaRPr lang="en-US" dirty="0"/>
+              <a:rPr lang="en-US" dirty="0"/>
+              <a:t>Add Values</a:t>
+            </a:r>
           </a:p>
         </p:txBody>
       </p:sp>
@@ -5033,7 +5032,7 @@
           <p:cNvPr id="3" name="Content Placeholder 2">
             <a:extLst>
               <a:ext uri="{FF2B5EF4-FFF2-40B4-BE49-F238E27FC236}">
-                <a16:creationId xmlns:a16="http://schemas.microsoft.com/office/drawing/2014/main" id="{BEE6AB40-2988-E34C-B136-9605755B3EF8}"/>
+                <a16:creationId xmlns:a16="http://schemas.microsoft.com/office/drawing/2014/main" id="{8771BB92-8EF6-8148-BB68-D744B7AC541E}"/>
               </a:ext>
             </a:extLst>
           </p:cNvPr>
@@ -5049,165 +5048,34 @@
           <a:bodyPr/>
           <a:lstStyle/>
           <a:p>
-            <a:pPr marL="0" indent="0">
-              <a:buNone/>
-            </a:pPr>
-            <a:r>
-              <a:rPr lang="en-NZ" b="1" dirty="0">
-                <a:solidFill>
-                  <a:schemeClr val="tx1"/>
-                </a:solidFill>
-              </a:rPr>
-              <a:t>Android Apps</a:t>
-            </a:r>
-          </a:p>
-          <a:p>
-            <a:r>
-              <a:rPr lang="en-NZ" b="1" dirty="0" err="1">
-                <a:solidFill>
-                  <a:schemeClr val="tx1"/>
-                </a:solidFill>
-              </a:rPr>
-              <a:t>DeDementia</a:t>
-            </a:r>
-            <a:r>
-              <a:rPr lang="en-NZ" b="1" dirty="0">
-                <a:solidFill>
-                  <a:schemeClr val="tx1"/>
-                </a:solidFill>
-              </a:rPr>
-              <a:t> Alzheimer’s Memory Diagnosis Test: MMSE</a:t>
-            </a:r>
-            <a:r>
-              <a:rPr lang="en-NZ" dirty="0">
-                <a:solidFill>
-                  <a:schemeClr val="tx1"/>
-                </a:solidFill>
-              </a:rPr>
-              <a:t> </a:t>
-            </a:r>
-          </a:p>
-          <a:p>
-            <a:r>
-              <a:rPr lang="en-US" b="1" spc="-100" dirty="0">
-                <a:solidFill>
-                  <a:schemeClr val="tx1"/>
-                </a:solidFill>
-              </a:rPr>
-              <a:t>Mini Mental State App</a:t>
-            </a:r>
-          </a:p>
-          <a:p>
-            <a:r>
-              <a:rPr lang="en-US" b="1" spc="-100" dirty="0">
-                <a:solidFill>
-                  <a:schemeClr val="tx1"/>
-                </a:solidFill>
-              </a:rPr>
-              <a:t>SOCA Dementia Testing App</a:t>
-            </a:r>
-          </a:p>
-          <a:p>
-            <a:r>
-              <a:rPr lang="en-US" b="1" spc="-100" dirty="0">
-                <a:solidFill>
-                  <a:schemeClr val="tx1"/>
-                </a:solidFill>
-              </a:rPr>
-              <a:t>My Brain</a:t>
-            </a:r>
-          </a:p>
-          <a:p>
-            <a:pPr marL="0" indent="0">
-              <a:buNone/>
-            </a:pPr>
-            <a:r>
-              <a:rPr lang="en-US" b="1" spc="-100" dirty="0">
-                <a:solidFill>
-                  <a:schemeClr val="tx1"/>
-                </a:solidFill>
-              </a:rPr>
-              <a:t>iOS Apps</a:t>
-            </a:r>
-          </a:p>
-          <a:p>
-            <a:r>
-              <a:rPr lang="en-NZ" b="1" dirty="0">
-                <a:solidFill>
-                  <a:schemeClr val="tx1"/>
-                </a:solidFill>
-              </a:rPr>
-              <a:t>Alzheimer’s Disease Pocket card</a:t>
-            </a:r>
-          </a:p>
-          <a:p>
-            <a:r>
-              <a:rPr lang="en-NZ" b="1" dirty="0">
-                <a:solidFill>
-                  <a:schemeClr val="tx1"/>
-                </a:solidFill>
-              </a:rPr>
-              <a:t>Alzheimer's and Dementia Tips for Families</a:t>
-            </a:r>
-          </a:p>
-          <a:p>
-            <a:r>
-              <a:rPr lang="en-US" b="1" spc="-100" dirty="0" err="1">
-                <a:solidFill>
-                  <a:schemeClr val="tx1"/>
-                </a:solidFill>
-              </a:rPr>
-              <a:t>DementiAssist</a:t>
-            </a:r>
-            <a:endParaRPr lang="en-US" b="1" spc="-100" dirty="0">
-              <a:solidFill>
-                <a:schemeClr val="tx1"/>
-              </a:solidFill>
-            </a:endParaRPr>
-          </a:p>
-          <a:p>
-            <a:r>
-              <a:rPr lang="en-NZ" b="1" dirty="0">
-                <a:solidFill>
-                  <a:schemeClr val="tx1"/>
-                </a:solidFill>
-              </a:rPr>
-              <a:t>Dementia Test - risk calculator of dementia</a:t>
-            </a:r>
-            <a:r>
-              <a:rPr lang="en-NZ" dirty="0">
-                <a:solidFill>
-                  <a:schemeClr val="tx1"/>
-                </a:solidFill>
-              </a:rPr>
-              <a:t> </a:t>
-            </a:r>
-            <a:br>
-              <a:rPr lang="en-NZ" b="1" i="1" dirty="0">
-                <a:solidFill>
-                  <a:schemeClr val="tx1"/>
-                </a:solidFill>
-              </a:rPr>
-            </a:br>
-            <a:endParaRPr lang="en-NZ" dirty="0">
-              <a:solidFill>
-                <a:schemeClr val="tx1"/>
-              </a:solidFill>
-            </a:endParaRPr>
-          </a:p>
-          <a:p>
-            <a:endParaRPr lang="en-US" dirty="0">
-              <a:solidFill>
-                <a:schemeClr val="tx1"/>
-              </a:solidFill>
-            </a:endParaRPr>
+            <a:r>
+              <a:rPr lang="en-US" dirty="0"/>
+              <a:t>Based on DSM-5 standard </a:t>
+            </a:r>
+          </a:p>
+          <a:p>
+            <a:r>
+              <a:rPr lang="en-US" dirty="0"/>
+              <a:t>Free iOS Mobile application for Alzheimer Pre-</a:t>
+            </a:r>
+            <a:r>
+              <a:rPr lang="en-US" dirty="0" err="1"/>
+              <a:t>Diagnisis</a:t>
+            </a:r>
+            <a:endParaRPr lang="en-US" dirty="0"/>
+          </a:p>
+          <a:p>
+            <a:endParaRPr lang="en-US" dirty="0"/>
+          </a:p>
+          <a:p>
+            <a:endParaRPr lang="en-US" dirty="0"/>
           </a:p>
         </p:txBody>
       </p:sp>
     </p:spTree>
     <p:extLst>
       <p:ext uri="{BB962C8B-B14F-4D97-AF65-F5344CB8AC3E}">
-        <p14:creationId xmlns:p14="http://schemas.microsoft.com/office/powerpoint/2010/main" val="46045909"/>
+        <p14:creationId xmlns:p14="http://schemas.microsoft.com/office/powerpoint/2010/main" val="268830784"/>
       </p:ext>
     </p:extLst>
   </p:cSld>
@@ -5239,7 +5107,7 @@
           <p:cNvPr id="2" name="Title 1">
             <a:extLst>
               <a:ext uri="{FF2B5EF4-FFF2-40B4-BE49-F238E27FC236}">
-                <a16:creationId xmlns:a16="http://schemas.microsoft.com/office/drawing/2014/main" id="{A94B4BC7-0D17-4942-9C99-5A131F9F8776}"/>
+                <a16:creationId xmlns:a16="http://schemas.microsoft.com/office/drawing/2014/main" id="{3B208F93-8020-AE42-B24A-2C10BC5666FC}"/>
               </a:ext>
             </a:extLst>
           </p:cNvPr>
@@ -5257,11 +5125,7 @@
           <a:p>
             <a:r>
               <a:rPr lang="en-NZ" b="1" dirty="0"/>
-              <a:t>Existing Applications Benefits and Faults</a:t>
-            </a:r>
-            <a:r>
-              <a:rPr lang="en-NZ" dirty="0"/>
-              <a:t> </a:t>
+              <a:t>Existing Applications</a:t>
             </a:r>
             <a:endParaRPr lang="en-US" dirty="0"/>
           </a:p>
@@ -5272,7 +5136,7 @@
           <p:cNvPr id="3" name="Content Placeholder 2">
             <a:extLst>
               <a:ext uri="{FF2B5EF4-FFF2-40B4-BE49-F238E27FC236}">
-                <a16:creationId xmlns:a16="http://schemas.microsoft.com/office/drawing/2014/main" id="{BF0BF267-8338-BC45-9EBE-7CE684F5C636}"/>
+                <a16:creationId xmlns:a16="http://schemas.microsoft.com/office/drawing/2014/main" id="{BEE6AB40-2988-E34C-B136-9605755B3EF8}"/>
               </a:ext>
             </a:extLst>
           </p:cNvPr>
@@ -5291,74 +5155,162 @@
             <a:pPr marL="0" indent="0">
               <a:buNone/>
             </a:pPr>
-            <a:endParaRPr lang="en-US" dirty="0"/>
+            <a:r>
+              <a:rPr lang="en-NZ" b="1" dirty="0">
+                <a:solidFill>
+                  <a:schemeClr val="tx1"/>
+                </a:solidFill>
+              </a:rPr>
+              <a:t>Android Apps</a:t>
+            </a:r>
+          </a:p>
+          <a:p>
+            <a:r>
+              <a:rPr lang="en-NZ" dirty="0" err="1">
+                <a:solidFill>
+                  <a:schemeClr val="tx1"/>
+                </a:solidFill>
+              </a:rPr>
+              <a:t>DeDementia</a:t>
+            </a:r>
+            <a:r>
+              <a:rPr lang="en-NZ" dirty="0">
+                <a:solidFill>
+                  <a:schemeClr val="tx1"/>
+                </a:solidFill>
+              </a:rPr>
+              <a:t> Alzheimer’s Memory Diagnosis Test: MMSE </a:t>
+            </a:r>
+          </a:p>
+          <a:p>
+            <a:r>
+              <a:rPr lang="en-US" spc="-100" dirty="0">
+                <a:solidFill>
+                  <a:schemeClr val="tx1"/>
+                </a:solidFill>
+              </a:rPr>
+              <a:t>Mini Mental State App</a:t>
+            </a:r>
+          </a:p>
+          <a:p>
+            <a:r>
+              <a:rPr lang="en-US" spc="-100" dirty="0">
+                <a:solidFill>
+                  <a:schemeClr val="tx1"/>
+                </a:solidFill>
+              </a:rPr>
+              <a:t>SOCA Dementia Testing App</a:t>
+            </a:r>
+          </a:p>
+          <a:p>
+            <a:r>
+              <a:rPr lang="en-US" spc="-100" dirty="0">
+                <a:solidFill>
+                  <a:schemeClr val="tx1"/>
+                </a:solidFill>
+              </a:rPr>
+              <a:t>My Brain</a:t>
+            </a:r>
           </a:p>
           <a:p>
             <a:pPr marL="0" indent="0">
               <a:buNone/>
             </a:pPr>
             <a:r>
-              <a:rPr lang="en-US" dirty="0"/>
-              <a:t>Pros</a:t>
-            </a:r>
-          </a:p>
-          <a:p>
-            <a:r>
-              <a:rPr lang="en-US" dirty="0"/>
-              <a:t>Most of  the apps are based on MMSE</a:t>
-            </a:r>
-          </a:p>
-          <a:p>
-            <a:r>
-              <a:rPr lang="en-US" dirty="0"/>
-              <a:t>Static Questions</a:t>
-            </a:r>
-          </a:p>
-          <a:p>
-            <a:r>
-              <a:rPr lang="en-US" dirty="0"/>
-              <a:t>Audio and Visual </a:t>
-            </a:r>
-          </a:p>
-          <a:p>
-            <a:pPr marL="0" indent="0">
-              <a:buNone/>
-            </a:pPr>
-            <a:r>
-              <a:rPr lang="en-US" dirty="0"/>
-              <a:t>Cons</a:t>
-            </a:r>
-          </a:p>
-          <a:p>
-            <a:r>
-              <a:rPr lang="en-US" dirty="0"/>
-              <a:t>Some iOS apps required professional assistance</a:t>
-            </a:r>
-          </a:p>
-          <a:p>
-            <a:r>
-              <a:rPr lang="en-US" dirty="0"/>
-              <a:t>Some features are device depended</a:t>
-            </a:r>
-          </a:p>
-          <a:p>
-            <a:r>
-              <a:rPr lang="en-US" dirty="0"/>
-              <a:t>Some app entire contents are downloaded into the phone which cause device performance issues</a:t>
-            </a:r>
-          </a:p>
-          <a:p>
-            <a:endParaRPr lang="en-US" dirty="0"/>
-          </a:p>
-          <a:p>
-            <a:endParaRPr lang="en-US" dirty="0"/>
+              <a:rPr lang="en-US" b="1" spc="-100" dirty="0">
+                <a:solidFill>
+                  <a:schemeClr val="tx1"/>
+                </a:solidFill>
+              </a:rPr>
+              <a:t>iOS Apps</a:t>
+            </a:r>
+          </a:p>
+          <a:p>
+            <a:r>
+              <a:rPr lang="en-NZ" dirty="0">
+                <a:solidFill>
+                  <a:schemeClr val="tx1"/>
+                </a:solidFill>
+              </a:rPr>
+              <a:t>Alzheimer’s Disease Pocket card</a:t>
+            </a:r>
+          </a:p>
+          <a:p>
+            <a:r>
+              <a:rPr lang="en-NZ" dirty="0">
+                <a:solidFill>
+                  <a:schemeClr val="tx1"/>
+                </a:solidFill>
+              </a:rPr>
+              <a:t>Alzheimer's and Dementia Tips for Families</a:t>
+            </a:r>
+          </a:p>
+          <a:p>
+            <a:r>
+              <a:rPr lang="en-US" spc="-100" dirty="0" err="1">
+                <a:solidFill>
+                  <a:schemeClr val="tx1"/>
+                </a:solidFill>
+              </a:rPr>
+              <a:t>DementiAssist</a:t>
+            </a:r>
+            <a:endParaRPr lang="en-US" spc="-100" dirty="0">
+              <a:solidFill>
+                <a:schemeClr val="tx1"/>
+              </a:solidFill>
+            </a:endParaRPr>
+          </a:p>
+          <a:p>
+            <a:r>
+              <a:rPr lang="en-NZ" dirty="0">
+                <a:solidFill>
+                  <a:schemeClr val="tx1"/>
+                </a:solidFill>
+              </a:rPr>
+              <a:t>Dementia Test - risk calculator of demen</a:t>
+            </a:r>
+            <a:r>
+              <a:rPr lang="en-NZ" b="1" dirty="0">
+                <a:solidFill>
+                  <a:schemeClr val="tx1"/>
+                </a:solidFill>
+              </a:rPr>
+              <a:t>tia</a:t>
+            </a:r>
+            <a:r>
+              <a:rPr lang="en-NZ" dirty="0">
+                <a:solidFill>
+                  <a:schemeClr val="tx1"/>
+                </a:solidFill>
+              </a:rPr>
+              <a:t> </a:t>
+            </a:r>
+            <a:br>
+              <a:rPr lang="en-NZ" b="1" i="1" dirty="0">
+                <a:solidFill>
+                  <a:schemeClr val="tx1"/>
+                </a:solidFill>
+              </a:rPr>
+            </a:br>
+            <a:endParaRPr lang="en-NZ" dirty="0">
+              <a:solidFill>
+                <a:schemeClr val="tx1"/>
+              </a:solidFill>
+            </a:endParaRPr>
+          </a:p>
+          <a:p>
+            <a:endParaRPr lang="en-US" dirty="0">
+              <a:solidFill>
+                <a:schemeClr val="tx1"/>
+              </a:solidFill>
+            </a:endParaRPr>
           </a:p>
         </p:txBody>
       </p:sp>
     </p:spTree>
     <p:extLst>
       <p:ext uri="{BB962C8B-B14F-4D97-AF65-F5344CB8AC3E}">
-        <p14:creationId xmlns:p14="http://schemas.microsoft.com/office/powerpoint/2010/main" val="1358253746"/>
+        <p14:creationId xmlns:p14="http://schemas.microsoft.com/office/powerpoint/2010/main" val="46045909"/>
       </p:ext>
     </p:extLst>
   </p:cSld>
@@ -5390,7 +5342,7 @@
           <p:cNvPr id="2" name="Title 1">
             <a:extLst>
               <a:ext uri="{FF2B5EF4-FFF2-40B4-BE49-F238E27FC236}">
-                <a16:creationId xmlns:a16="http://schemas.microsoft.com/office/drawing/2014/main" id="{380E3E29-98C8-004F-93A3-3EA2286853FB}"/>
+                <a16:creationId xmlns:a16="http://schemas.microsoft.com/office/drawing/2014/main" id="{A94B4BC7-0D17-4942-9C99-5A131F9F8776}"/>
               </a:ext>
             </a:extLst>
           </p:cNvPr>
@@ -5407,9 +5359,14 @@
           <a:lstStyle/>
           <a:p>
             <a:r>
-              <a:rPr lang="en-US" dirty="0"/>
-              <a:t>Add Values</a:t>
-            </a:r>
+              <a:rPr lang="en-NZ" b="1" dirty="0"/>
+              <a:t>Existing Applications Benefits and Faults</a:t>
+            </a:r>
+            <a:r>
+              <a:rPr lang="en-NZ" dirty="0"/>
+              <a:t> </a:t>
+            </a:r>
+            <a:endParaRPr lang="en-US" dirty="0"/>
           </a:p>
         </p:txBody>
       </p:sp>
@@ -5418,7 +5375,7 @@
           <p:cNvPr id="3" name="Content Placeholder 2">
             <a:extLst>
               <a:ext uri="{FF2B5EF4-FFF2-40B4-BE49-F238E27FC236}">
-                <a16:creationId xmlns:a16="http://schemas.microsoft.com/office/drawing/2014/main" id="{8771BB92-8EF6-8148-BB68-D744B7AC541E}"/>
+                <a16:creationId xmlns:a16="http://schemas.microsoft.com/office/drawing/2014/main" id="{BF0BF267-8338-BC45-9EBE-7CE684F5C636}"/>
               </a:ext>
             </a:extLst>
           </p:cNvPr>
@@ -5434,15 +5391,63 @@
           <a:bodyPr/>
           <a:lstStyle/>
           <a:p>
+            <a:pPr marL="0" indent="0">
+              <a:buNone/>
+            </a:pPr>
+            <a:endParaRPr lang="en-US" dirty="0"/>
+          </a:p>
+          <a:p>
+            <a:pPr marL="0" indent="0">
+              <a:buNone/>
+            </a:pPr>
             <a:r>
               <a:rPr lang="en-US" dirty="0"/>
-              <a:t>Based on DSM-5 standard </a:t>
-            </a:r>
-          </a:p>
-          <a:p>
-            <a:r>
-              <a:rPr lang="en-US"/>
-              <a:t>Free application</a:t>
+              <a:t>Pros</a:t>
+            </a:r>
+          </a:p>
+          <a:p>
+            <a:r>
+              <a:rPr lang="en-US" dirty="0"/>
+              <a:t>Most of  the apps are based on MMSE</a:t>
+            </a:r>
+          </a:p>
+          <a:p>
+            <a:r>
+              <a:rPr lang="en-US" dirty="0"/>
+              <a:t>Static Questions</a:t>
+            </a:r>
+          </a:p>
+          <a:p>
+            <a:r>
+              <a:rPr lang="en-US" dirty="0"/>
+              <a:t>Audio and Visual </a:t>
+            </a:r>
+          </a:p>
+          <a:p>
+            <a:pPr marL="0" indent="0">
+              <a:buNone/>
+            </a:pPr>
+            <a:r>
+              <a:rPr lang="en-US" dirty="0"/>
+              <a:t>Cons</a:t>
+            </a:r>
+          </a:p>
+          <a:p>
+            <a:r>
+              <a:rPr lang="en-US" dirty="0"/>
+              <a:t>Some iOS apps required professional assistance</a:t>
+            </a:r>
+          </a:p>
+          <a:p>
+            <a:r>
+              <a:rPr lang="en-US" dirty="0"/>
+              <a:t>Some features are device depended</a:t>
+            </a:r>
+          </a:p>
+          <a:p>
+            <a:r>
+              <a:rPr lang="en-US" dirty="0"/>
+              <a:t>Some app entire contents are downloaded into the phone which cause device performance issues</a:t>
             </a:r>
           </a:p>
           <a:p>
@@ -5456,7 +5461,7 @@
     </p:spTree>
     <p:extLst>
       <p:ext uri="{BB962C8B-B14F-4D97-AF65-F5344CB8AC3E}">
-        <p14:creationId xmlns:p14="http://schemas.microsoft.com/office/powerpoint/2010/main" val="268830784"/>
+        <p14:creationId xmlns:p14="http://schemas.microsoft.com/office/powerpoint/2010/main" val="1358253746"/>
       </p:ext>
     </p:extLst>
   </p:cSld>

</xml_diff>